<commit_message>
updated last slide #25
</commit_message>
<xml_diff>
--- a/_Life_Lose_Weight.pptx
+++ b/_Life_Lose_Weight.pptx
@@ -221,7 +221,7 @@
           <a:p>
             <a:fld id="{88E52045-756B-384E-A6E6-7F3ED1EF79B4}" type="datetimeFigureOut">
               <a:rPr lang="en-US" smtClean="0"/>
-              <a:t>5/27/21</a:t>
+              <a:t>6/1/21</a:t>
             </a:fld>
             <a:endParaRPr lang="en-US"/>
           </a:p>
@@ -617,7 +617,7 @@
           <a:p>
             <a:fld id="{B99DC7AF-117D-0D44-9887-15AB809462D7}" type="datetimeFigureOut">
               <a:rPr lang="en-US" smtClean="0"/>
-              <a:t>5/27/21</a:t>
+              <a:t>6/1/21</a:t>
             </a:fld>
             <a:endParaRPr lang="en-US"/>
           </a:p>
@@ -785,7 +785,7 @@
           <a:p>
             <a:fld id="{B99DC7AF-117D-0D44-9887-15AB809462D7}" type="datetimeFigureOut">
               <a:rPr lang="en-US" smtClean="0"/>
-              <a:t>5/27/21</a:t>
+              <a:t>6/1/21</a:t>
             </a:fld>
             <a:endParaRPr lang="en-US"/>
           </a:p>
@@ -963,7 +963,7 @@
           <a:p>
             <a:fld id="{B99DC7AF-117D-0D44-9887-15AB809462D7}" type="datetimeFigureOut">
               <a:rPr lang="en-US" smtClean="0"/>
-              <a:t>5/27/21</a:t>
+              <a:t>6/1/21</a:t>
             </a:fld>
             <a:endParaRPr lang="en-US"/>
           </a:p>
@@ -1131,7 +1131,7 @@
           <a:p>
             <a:fld id="{B99DC7AF-117D-0D44-9887-15AB809462D7}" type="datetimeFigureOut">
               <a:rPr lang="en-US" smtClean="0"/>
-              <a:t>5/27/21</a:t>
+              <a:t>6/1/21</a:t>
             </a:fld>
             <a:endParaRPr lang="en-US"/>
           </a:p>
@@ -1376,7 +1376,7 @@
           <a:p>
             <a:fld id="{B99DC7AF-117D-0D44-9887-15AB809462D7}" type="datetimeFigureOut">
               <a:rPr lang="en-US" smtClean="0"/>
-              <a:t>5/27/21</a:t>
+              <a:t>6/1/21</a:t>
             </a:fld>
             <a:endParaRPr lang="en-US"/>
           </a:p>
@@ -1605,7 +1605,7 @@
           <a:p>
             <a:fld id="{B99DC7AF-117D-0D44-9887-15AB809462D7}" type="datetimeFigureOut">
               <a:rPr lang="en-US" smtClean="0"/>
-              <a:t>5/27/21</a:t>
+              <a:t>6/1/21</a:t>
             </a:fld>
             <a:endParaRPr lang="en-US"/>
           </a:p>
@@ -1969,7 +1969,7 @@
           <a:p>
             <a:fld id="{B99DC7AF-117D-0D44-9887-15AB809462D7}" type="datetimeFigureOut">
               <a:rPr lang="en-US" smtClean="0"/>
-              <a:t>5/27/21</a:t>
+              <a:t>6/1/21</a:t>
             </a:fld>
             <a:endParaRPr lang="en-US"/>
           </a:p>
@@ -2086,7 +2086,7 @@
           <a:p>
             <a:fld id="{B99DC7AF-117D-0D44-9887-15AB809462D7}" type="datetimeFigureOut">
               <a:rPr lang="en-US" smtClean="0"/>
-              <a:t>5/27/21</a:t>
+              <a:t>6/1/21</a:t>
             </a:fld>
             <a:endParaRPr lang="en-US"/>
           </a:p>
@@ -2181,7 +2181,7 @@
           <a:p>
             <a:fld id="{B99DC7AF-117D-0D44-9887-15AB809462D7}" type="datetimeFigureOut">
               <a:rPr lang="en-US" smtClean="0"/>
-              <a:t>5/27/21</a:t>
+              <a:t>6/1/21</a:t>
             </a:fld>
             <a:endParaRPr lang="en-US"/>
           </a:p>
@@ -2456,7 +2456,7 @@
           <a:p>
             <a:fld id="{B99DC7AF-117D-0D44-9887-15AB809462D7}" type="datetimeFigureOut">
               <a:rPr lang="en-US" smtClean="0"/>
-              <a:t>5/27/21</a:t>
+              <a:t>6/1/21</a:t>
             </a:fld>
             <a:endParaRPr lang="en-US"/>
           </a:p>
@@ -2708,7 +2708,7 @@
           <a:p>
             <a:fld id="{B99DC7AF-117D-0D44-9887-15AB809462D7}" type="datetimeFigureOut">
               <a:rPr lang="en-US" smtClean="0"/>
-              <a:t>5/27/21</a:t>
+              <a:t>6/1/21</a:t>
             </a:fld>
             <a:endParaRPr lang="en-US"/>
           </a:p>
@@ -2919,7 +2919,7 @@
           <a:p>
             <a:fld id="{B99DC7AF-117D-0D44-9887-15AB809462D7}" type="datetimeFigureOut">
               <a:rPr lang="en-US" smtClean="0"/>
-              <a:t>5/27/21</a:t>
+              <a:t>6/1/21</a:t>
             </a:fld>
             <a:endParaRPr lang="en-US"/>
           </a:p>
@@ -12194,8 +12194,8 @@
         </p:nvSpPr>
         <p:spPr>
           <a:xfrm>
-            <a:off x="105508" y="1185244"/>
-            <a:ext cx="5889812" cy="2862322"/>
+            <a:off x="181121" y="1046229"/>
+            <a:ext cx="3688726" cy="1600438"/>
           </a:xfrm>
           <a:prstGeom prst="rect">
             <a:avLst/>
@@ -12219,31 +12219,12 @@
             <a:br>
               <a:rPr lang="en-US" b="1" dirty="0"/>
             </a:br>
-            <a:endParaRPr lang="en-US" b="1" dirty="0"/>
+            <a:endParaRPr lang="en-US" sz="800" b="1" dirty="0"/>
           </a:p>
           <a:p>
             <a:r>
               <a:rPr lang="en-US" dirty="0"/>
               <a:t>Probably 90% of foods which are being sold in supermarkets are not good for you.</a:t>
-            </a:r>
-            <a:br>
-              <a:rPr lang="en-US" dirty="0"/>
-            </a:br>
-            <a:br>
-              <a:rPr lang="en-US" dirty="0"/>
-            </a:br>
-            <a:r>
-              <a:rPr lang="en-US" dirty="0"/>
-              <a:t>If you will be doing what is considered "normal" - you will get fat and sick like the rest of Americans.</a:t>
-            </a:r>
-          </a:p>
-          <a:p>
-            <a:br>
-              <a:rPr lang="en-US" dirty="0"/>
-            </a:br>
-            <a:r>
-              <a:rPr lang="en-US" dirty="0"/>
-              <a:t>To stay healthy (and lean) you must do something different from what is considered "normal".</a:t>
             </a:r>
           </a:p>
         </p:txBody>
@@ -12262,8 +12243,8 @@
         </p:nvSpPr>
         <p:spPr>
           <a:xfrm>
-            <a:off x="6785925" y="410841"/>
-            <a:ext cx="5300567" cy="5909310"/>
+            <a:off x="6924981" y="202871"/>
+            <a:ext cx="2806261" cy="2585323"/>
           </a:xfrm>
           <a:prstGeom prst="rect">
             <a:avLst/>
@@ -12291,56 +12272,14 @@
           <a:p>
             <a:r>
               <a:rPr lang="en-US" dirty="0"/>
-              <a:t>Many people have developed food addictions.</a:t>
-            </a:r>
-          </a:p>
-          <a:p>
-            <a:r>
-              <a:rPr lang="en-US" dirty="0"/>
-              <a:t>Food addictions can be as strong as drug addiction or alcoholism.</a:t>
+              <a:t>Food Addictions can be as strong as drug addiction or alcoholism – as was proven by multiple scientific studies.</a:t>
             </a:r>
           </a:p>
           <a:p>
             <a:endParaRPr lang="en-US" dirty="0"/>
           </a:p>
           <a:p>
-            <a:r>
-              <a:rPr lang="en-US" dirty="0"/>
-              <a:t>FA is real, it was proven by multiple scientific studies.</a:t>
-            </a:r>
-          </a:p>
-          <a:p>
             <a:endParaRPr lang="en-US" dirty="0"/>
-          </a:p>
-          <a:p>
-            <a:r>
-              <a:rPr lang="en-US" dirty="0"/>
-              <a:t>Every year more than 100 thousand people in America lose their limbs or go blind because of type 2 diabetes. Which could've been prevented by simply changing their eating habits. But those people struggled and failed to do this.</a:t>
-            </a:r>
-          </a:p>
-          <a:p>
-            <a:endParaRPr lang="en-US" dirty="0"/>
-          </a:p>
-          <a:p>
-            <a:r>
-              <a:rPr lang="en-US" dirty="0"/>
-              <a:t>Some foods (like sugar or flower) are extremely potent at promoting FA (Food Addiction).</a:t>
-            </a:r>
-          </a:p>
-          <a:p>
-            <a:r>
-              <a:rPr lang="en-US" dirty="0"/>
-              <a:t>It was shown that brain chemistry changes (down-regulation of dopamine receptors).</a:t>
-            </a:r>
-          </a:p>
-          <a:p>
-            <a:endParaRPr lang="en-US" dirty="0"/>
-          </a:p>
-          <a:p>
-            <a:r>
-              <a:rPr lang="en-US" dirty="0"/>
-              <a:t>The good thing is that there are ways to reverse the process. </a:t>
-            </a:r>
           </a:p>
         </p:txBody>
       </p:sp>
@@ -12379,6 +12318,322 @@
           </a:p>
         </p:txBody>
       </p:sp>
+      <p:pic>
+        <p:nvPicPr>
+          <p:cNvPr id="1026" name="Picture 2" descr="One is against many stock illustration. Illustration of business - 39471758">
+            <a:extLst>
+              <a:ext uri="{FF2B5EF4-FFF2-40B4-BE49-F238E27FC236}">
+                <a16:creationId xmlns:a16="http://schemas.microsoft.com/office/drawing/2014/main" id="{098548E2-9762-964D-A82B-94F5DB9F2F08}"/>
+              </a:ext>
+            </a:extLst>
+          </p:cNvPr>
+          <p:cNvPicPr>
+            <a:picLocks noChangeAspect="1" noChangeArrowheads="1"/>
+          </p:cNvPicPr>
+          <p:nvPr/>
+        </p:nvPicPr>
+        <p:blipFill>
+          <a:blip r:embed="rId2" cstate="email">
+            <a:extLst>
+              <a:ext uri="{28A0092B-C50C-407E-A947-70E740481C1C}">
+                <a14:useLocalDpi xmlns:a14="http://schemas.microsoft.com/office/drawing/2010/main"/>
+              </a:ext>
+            </a:extLst>
+          </a:blip>
+          <a:srcRect/>
+          <a:stretch>
+            <a:fillRect/>
+          </a:stretch>
+        </p:blipFill>
+        <p:spPr bwMode="auto">
+          <a:xfrm>
+            <a:off x="1440438" y="4690657"/>
+            <a:ext cx="2988441" cy="1867776"/>
+          </a:xfrm>
+          <a:prstGeom prst="rect">
+            <a:avLst/>
+          </a:prstGeom>
+          <a:noFill/>
+          <a:extLst>
+            <a:ext uri="{909E8E84-426E-40DD-AFC4-6F175D3DCCD1}">
+              <a14:hiddenFill xmlns:a14="http://schemas.microsoft.com/office/drawing/2010/main">
+                <a:solidFill>
+                  <a:srgbClr val="FFFFFF"/>
+                </a:solidFill>
+              </a14:hiddenFill>
+            </a:ext>
+          </a:extLst>
+        </p:spPr>
+      </p:pic>
+      <p:pic>
+        <p:nvPicPr>
+          <p:cNvPr id="1028" name="Picture 4" descr="How To ACTUALLY Escape And Survive An Active Minefield Alive - YouTube">
+            <a:extLst>
+              <a:ext uri="{FF2B5EF4-FFF2-40B4-BE49-F238E27FC236}">
+                <a16:creationId xmlns:a16="http://schemas.microsoft.com/office/drawing/2014/main" id="{528FF7D0-0774-3044-B4FA-FF83E7B3F755}"/>
+              </a:ext>
+            </a:extLst>
+          </p:cNvPr>
+          <p:cNvPicPr>
+            <a:picLocks noChangeAspect="1" noChangeArrowheads="1"/>
+          </p:cNvPicPr>
+          <p:nvPr/>
+        </p:nvPicPr>
+        <p:blipFill>
+          <a:blip r:embed="rId3" cstate="email">
+            <a:extLst>
+              <a:ext uri="{28A0092B-C50C-407E-A947-70E740481C1C}">
+                <a14:useLocalDpi xmlns:a14="http://schemas.microsoft.com/office/drawing/2010/main"/>
+              </a:ext>
+            </a:extLst>
+          </a:blip>
+          <a:srcRect/>
+          <a:stretch>
+            <a:fillRect/>
+          </a:stretch>
+        </p:blipFill>
+        <p:spPr bwMode="auto">
+          <a:xfrm>
+            <a:off x="3860945" y="1197268"/>
+            <a:ext cx="2209988" cy="1237593"/>
+          </a:xfrm>
+          <a:prstGeom prst="rect">
+            <a:avLst/>
+          </a:prstGeom>
+          <a:noFill/>
+          <a:extLst>
+            <a:ext uri="{909E8E84-426E-40DD-AFC4-6F175D3DCCD1}">
+              <a14:hiddenFill xmlns:a14="http://schemas.microsoft.com/office/drawing/2010/main">
+                <a:solidFill>
+                  <a:srgbClr val="FFFFFF"/>
+                </a:solidFill>
+              </a14:hiddenFill>
+            </a:ext>
+          </a:extLst>
+        </p:spPr>
+      </p:pic>
+      <p:sp>
+        <p:nvSpPr>
+          <p:cNvPr id="7" name="TextBox 6">
+            <a:extLst>
+              <a:ext uri="{FF2B5EF4-FFF2-40B4-BE49-F238E27FC236}">
+                <a16:creationId xmlns:a16="http://schemas.microsoft.com/office/drawing/2014/main" id="{6C630CE9-E1E8-694F-865A-D92B81B799A3}"/>
+              </a:ext>
+            </a:extLst>
+          </p:cNvPr>
+          <p:cNvSpPr txBox="1"/>
+          <p:nvPr/>
+        </p:nvSpPr>
+        <p:spPr>
+          <a:xfrm>
+            <a:off x="181121" y="3124837"/>
+            <a:ext cx="5889812" cy="1323439"/>
+          </a:xfrm>
+          <a:prstGeom prst="rect">
+            <a:avLst/>
+          </a:prstGeom>
+          <a:noFill/>
+        </p:spPr>
+        <p:txBody>
+          <a:bodyPr wrap="square" rtlCol="0">
+            <a:spAutoFit/>
+          </a:bodyPr>
+          <a:lstStyle/>
+          <a:p>
+            <a:r>
+              <a:rPr lang="en-US" dirty="0"/>
+              <a:t>If you will be doing what is considered "normal" - you will get fat and sick like the rest of Americans.</a:t>
+            </a:r>
+          </a:p>
+          <a:p>
+            <a:br>
+              <a:rPr lang="en-US" sz="800" dirty="0"/>
+            </a:br>
+            <a:r>
+              <a:rPr lang="en-US" dirty="0"/>
+              <a:t>To stay healthy (and lean) you must do something different from what is considered "normal".</a:t>
+            </a:r>
+          </a:p>
+        </p:txBody>
+      </p:sp>
+      <p:pic>
+        <p:nvPicPr>
+          <p:cNvPr id="1030" name="Picture 6" descr="Food Addiction Images, Stock Photos &amp; Vectors | Shutterstock">
+            <a:extLst>
+              <a:ext uri="{FF2B5EF4-FFF2-40B4-BE49-F238E27FC236}">
+                <a16:creationId xmlns:a16="http://schemas.microsoft.com/office/drawing/2014/main" id="{CCCE66E7-8F78-764C-856B-5EE096575602}"/>
+              </a:ext>
+            </a:extLst>
+          </p:cNvPr>
+          <p:cNvPicPr>
+            <a:picLocks noChangeAspect="1" noChangeArrowheads="1"/>
+          </p:cNvPicPr>
+          <p:nvPr/>
+        </p:nvPicPr>
+        <p:blipFill rotWithShape="1">
+          <a:blip r:embed="rId4" cstate="email">
+            <a:extLst>
+              <a:ext uri="{28A0092B-C50C-407E-A947-70E740481C1C}">
+                <a14:useLocalDpi xmlns:a14="http://schemas.microsoft.com/office/drawing/2010/main"/>
+              </a:ext>
+            </a:extLst>
+          </a:blip>
+          <a:srcRect/>
+          <a:stretch/>
+        </p:blipFill>
+        <p:spPr bwMode="auto">
+          <a:xfrm>
+            <a:off x="9656811" y="117231"/>
+            <a:ext cx="2429681" cy="2006216"/>
+          </a:xfrm>
+          <a:prstGeom prst="rect">
+            <a:avLst/>
+          </a:prstGeom>
+          <a:noFill/>
+          <a:extLst>
+            <a:ext uri="{909E8E84-426E-40DD-AFC4-6F175D3DCCD1}">
+              <a14:hiddenFill xmlns:a14="http://schemas.microsoft.com/office/drawing/2010/main">
+                <a:solidFill>
+                  <a:srgbClr val="FFFFFF"/>
+                </a:solidFill>
+              </a14:hiddenFill>
+            </a:ext>
+          </a:extLst>
+        </p:spPr>
+      </p:pic>
+      <p:sp>
+        <p:nvSpPr>
+          <p:cNvPr id="9" name="TextBox 8">
+            <a:extLst>
+              <a:ext uri="{FF2B5EF4-FFF2-40B4-BE49-F238E27FC236}">
+                <a16:creationId xmlns:a16="http://schemas.microsoft.com/office/drawing/2014/main" id="{B4D58C74-0EF3-C446-9C58-5E1EC78C9C0B}"/>
+              </a:ext>
+            </a:extLst>
+          </p:cNvPr>
+          <p:cNvSpPr txBox="1"/>
+          <p:nvPr/>
+        </p:nvSpPr>
+        <p:spPr>
+          <a:xfrm>
+            <a:off x="6924980" y="5263441"/>
+            <a:ext cx="5300567" cy="1477328"/>
+          </a:xfrm>
+          <a:prstGeom prst="rect">
+            <a:avLst/>
+          </a:prstGeom>
+          <a:noFill/>
+        </p:spPr>
+        <p:txBody>
+          <a:bodyPr wrap="square" rtlCol="0">
+            <a:spAutoFit/>
+          </a:bodyPr>
+          <a:lstStyle/>
+          <a:p>
+            <a:r>
+              <a:rPr lang="en-US" dirty="0"/>
+              <a:t>Every year more than 100,000 people in America </a:t>
+            </a:r>
+            <a:r>
+              <a:rPr lang="en-US" b="1" dirty="0">
+                <a:solidFill>
+                  <a:srgbClr val="FF0000"/>
+                </a:solidFill>
+              </a:rPr>
+              <a:t>lose their limbs or go blind</a:t>
+            </a:r>
+            <a:r>
+              <a:rPr lang="en-US" dirty="0"/>
+              <a:t> because of type 2 diabetes. Which could've been prevented and cured in few weeks by simply changing their eating habits. </a:t>
+            </a:r>
+          </a:p>
+          <a:p>
+            <a:r>
+              <a:rPr lang="en-US" dirty="0"/>
+              <a:t>But those people struggled and failed to do this.</a:t>
+            </a:r>
+          </a:p>
+        </p:txBody>
+      </p:sp>
+      <p:sp>
+        <p:nvSpPr>
+          <p:cNvPr id="5" name="TextBox 4">
+            <a:extLst>
+              <a:ext uri="{FF2B5EF4-FFF2-40B4-BE49-F238E27FC236}">
+                <a16:creationId xmlns:a16="http://schemas.microsoft.com/office/drawing/2014/main" id="{F3DA064D-E23A-2147-9CA0-5D3BF0F5216A}"/>
+              </a:ext>
+            </a:extLst>
+          </p:cNvPr>
+          <p:cNvSpPr txBox="1"/>
+          <p:nvPr/>
+        </p:nvSpPr>
+        <p:spPr>
+          <a:xfrm>
+            <a:off x="6924980" y="2315481"/>
+            <a:ext cx="5161511" cy="923330"/>
+          </a:xfrm>
+          <a:prstGeom prst="rect">
+            <a:avLst/>
+          </a:prstGeom>
+          <a:noFill/>
+        </p:spPr>
+        <p:txBody>
+          <a:bodyPr wrap="square" rtlCol="0">
+            <a:spAutoFit/>
+          </a:bodyPr>
+          <a:lstStyle/>
+          <a:p>
+            <a:r>
+              <a:rPr lang="en-US" dirty="0"/>
+              <a:t>Some foods (like sugar or flour) are extremely potent at promoting FA (Food Addiction) and changing brain chemistry (down-regulation of dopamine receptors).</a:t>
+            </a:r>
+          </a:p>
+        </p:txBody>
+      </p:sp>
+      <p:pic>
+        <p:nvPicPr>
+          <p:cNvPr id="1032" name="Picture 8" descr="Diabetes… out of control! - Gangrene Pictures - MEDizzy Journal">
+            <a:extLst>
+              <a:ext uri="{FF2B5EF4-FFF2-40B4-BE49-F238E27FC236}">
+                <a16:creationId xmlns:a16="http://schemas.microsoft.com/office/drawing/2014/main" id="{EC55DE90-2CEF-BF4D-B983-A026CC242DB3}"/>
+              </a:ext>
+            </a:extLst>
+          </p:cNvPr>
+          <p:cNvPicPr>
+            <a:picLocks noChangeAspect="1" noChangeArrowheads="1"/>
+          </p:cNvPicPr>
+          <p:nvPr/>
+        </p:nvPicPr>
+        <p:blipFill rotWithShape="1">
+          <a:blip r:embed="rId5" cstate="email">
+            <a:extLst>
+              <a:ext uri="{28A0092B-C50C-407E-A947-70E740481C1C}">
+                <a14:useLocalDpi xmlns:a14="http://schemas.microsoft.com/office/drawing/2010/main"/>
+              </a:ext>
+            </a:extLst>
+          </a:blip>
+          <a:srcRect/>
+          <a:stretch/>
+        </p:blipFill>
+        <p:spPr bwMode="auto">
+          <a:xfrm>
+            <a:off x="8702258" y="3472331"/>
+            <a:ext cx="1606953" cy="1557590"/>
+          </a:xfrm>
+          <a:prstGeom prst="rect">
+            <a:avLst/>
+          </a:prstGeom>
+          <a:noFill/>
+          <a:extLst>
+            <a:ext uri="{909E8E84-426E-40DD-AFC4-6F175D3DCCD1}">
+              <a14:hiddenFill xmlns:a14="http://schemas.microsoft.com/office/drawing/2010/main">
+                <a:solidFill>
+                  <a:srgbClr val="FFFFFF"/>
+                </a:solidFill>
+              </a14:hiddenFill>
+            </a:ext>
+          </a:extLst>
+        </p:spPr>
+      </p:pic>
     </p:spTree>
     <p:extLst>
       <p:ext uri="{BB962C8B-B14F-4D97-AF65-F5344CB8AC3E}">

</xml_diff>